<commit_message>
Updates for Final Power Meeting - vignette check - helpfile check - bug fix getCV_CReSS - bug fix summary function (short spatial names when no 1d terms) - check all functions and examples for new version of MRSea - add generate noise function (same as in MRSeaPower) to allow ease of empirical distribution calculation.
</commit_message>
<xml_diff>
--- a/MRSea_workflow.pptx
+++ b/MRSea_workflow.pptx
@@ -104,6 +104,22 @@
       </a:defRPr>
     </a:lvl9pPr>
   </p:defaultTextStyle>
+  <p:extLst>
+    <p:ext uri="{EFAFB233-063F-42B5-8137-9DF3F51BA10A}">
+      <p15:sldGuideLst xmlns:p15="http://schemas.microsoft.com/office/powerpoint/2012/main">
+        <p15:guide id="1" orient="horz" pos="2160">
+          <p15:clr>
+            <a:srgbClr val="A4A3A4"/>
+          </p15:clr>
+        </p15:guide>
+        <p15:guide id="2" pos="2880">
+          <p15:clr>
+            <a:srgbClr val="A4A3A4"/>
+          </p15:clr>
+        </p15:guide>
+      </p15:sldGuideLst>
+    </p:ext>
+  </p:extLst>
 </p:presentation>
 </file>
 
@@ -288,7 +304,7 @@
           <a:p>
             <a:fld id="{E7DCFD55-52F6-4EDE-9B60-E33ACF61B083}" type="datetimeFigureOut">
               <a:rPr lang="en-GB" smtClean="0"/>
-              <a:t>05/02/2015</a:t>
+              <a:t>10/03/2017</a:t>
             </a:fld>
             <a:endParaRPr lang="en-GB"/>
           </a:p>
@@ -458,7 +474,7 @@
           <a:p>
             <a:fld id="{E7DCFD55-52F6-4EDE-9B60-E33ACF61B083}" type="datetimeFigureOut">
               <a:rPr lang="en-GB" smtClean="0"/>
-              <a:t>05/02/2015</a:t>
+              <a:t>10/03/2017</a:t>
             </a:fld>
             <a:endParaRPr lang="en-GB"/>
           </a:p>
@@ -638,7 +654,7 @@
           <a:p>
             <a:fld id="{E7DCFD55-52F6-4EDE-9B60-E33ACF61B083}" type="datetimeFigureOut">
               <a:rPr lang="en-GB" smtClean="0"/>
-              <a:t>05/02/2015</a:t>
+              <a:t>10/03/2017</a:t>
             </a:fld>
             <a:endParaRPr lang="en-GB"/>
           </a:p>
@@ -808,7 +824,7 @@
           <a:p>
             <a:fld id="{E7DCFD55-52F6-4EDE-9B60-E33ACF61B083}" type="datetimeFigureOut">
               <a:rPr lang="en-GB" smtClean="0"/>
-              <a:t>05/02/2015</a:t>
+              <a:t>10/03/2017</a:t>
             </a:fld>
             <a:endParaRPr lang="en-GB"/>
           </a:p>
@@ -1054,7 +1070,7 @@
           <a:p>
             <a:fld id="{E7DCFD55-52F6-4EDE-9B60-E33ACF61B083}" type="datetimeFigureOut">
               <a:rPr lang="en-GB" smtClean="0"/>
-              <a:t>05/02/2015</a:t>
+              <a:t>10/03/2017</a:t>
             </a:fld>
             <a:endParaRPr lang="en-GB"/>
           </a:p>
@@ -1342,7 +1358,7 @@
           <a:p>
             <a:fld id="{E7DCFD55-52F6-4EDE-9B60-E33ACF61B083}" type="datetimeFigureOut">
               <a:rPr lang="en-GB" smtClean="0"/>
-              <a:t>05/02/2015</a:t>
+              <a:t>10/03/2017</a:t>
             </a:fld>
             <a:endParaRPr lang="en-GB"/>
           </a:p>
@@ -1764,7 +1780,7 @@
           <a:p>
             <a:fld id="{E7DCFD55-52F6-4EDE-9B60-E33ACF61B083}" type="datetimeFigureOut">
               <a:rPr lang="en-GB" smtClean="0"/>
-              <a:t>05/02/2015</a:t>
+              <a:t>10/03/2017</a:t>
             </a:fld>
             <a:endParaRPr lang="en-GB"/>
           </a:p>
@@ -1882,7 +1898,7 @@
           <a:p>
             <a:fld id="{E7DCFD55-52F6-4EDE-9B60-E33ACF61B083}" type="datetimeFigureOut">
               <a:rPr lang="en-GB" smtClean="0"/>
-              <a:t>05/02/2015</a:t>
+              <a:t>10/03/2017</a:t>
             </a:fld>
             <a:endParaRPr lang="en-GB"/>
           </a:p>
@@ -1977,7 +1993,7 @@
           <a:p>
             <a:fld id="{E7DCFD55-52F6-4EDE-9B60-E33ACF61B083}" type="datetimeFigureOut">
               <a:rPr lang="en-GB" smtClean="0"/>
-              <a:t>05/02/2015</a:t>
+              <a:t>10/03/2017</a:t>
             </a:fld>
             <a:endParaRPr lang="en-GB"/>
           </a:p>
@@ -2254,7 +2270,7 @@
           <a:p>
             <a:fld id="{E7DCFD55-52F6-4EDE-9B60-E33ACF61B083}" type="datetimeFigureOut">
               <a:rPr lang="en-GB" smtClean="0"/>
-              <a:t>05/02/2015</a:t>
+              <a:t>10/03/2017</a:t>
             </a:fld>
             <a:endParaRPr lang="en-GB"/>
           </a:p>
@@ -2507,7 +2523,7 @@
           <a:p>
             <a:fld id="{E7DCFD55-52F6-4EDE-9B60-E33ACF61B083}" type="datetimeFigureOut">
               <a:rPr lang="en-GB" smtClean="0"/>
-              <a:t>05/02/2015</a:t>
+              <a:t>10/03/2017</a:t>
             </a:fld>
             <a:endParaRPr lang="en-GB"/>
           </a:p>
@@ -2720,7 +2736,7 @@
           <a:p>
             <a:fld id="{E7DCFD55-52F6-4EDE-9B60-E33ACF61B083}" type="datetimeFigureOut">
               <a:rPr lang="en-GB" smtClean="0"/>
-              <a:t>05/02/2015</a:t>
+              <a:t>10/03/2017</a:t>
             </a:fld>
             <a:endParaRPr lang="en-GB"/>
           </a:p>
@@ -3103,8 +3119,8 @@
         </p:nvSpPr>
         <p:spPr>
           <a:xfrm>
-            <a:off x="6924837" y="332656"/>
-            <a:ext cx="2096901" cy="896373"/>
+            <a:off x="6791199" y="0"/>
+            <a:ext cx="2230539" cy="1229030"/>
           </a:xfrm>
           <a:prstGeom prst="ellipse">
             <a:avLst/>
@@ -3176,7 +3192,7 @@
                 <a:latin typeface="Courier New" panose="02070309020205020404" pitchFamily="49" charset="0"/>
                 <a:cs typeface="Courier New" panose="02070309020205020404" pitchFamily="49" charset="0"/>
               </a:rPr>
-              <a:t>getPvalues</a:t>
+              <a:t>getCV_cress</a:t>
             </a:r>
             <a:r>
               <a:rPr lang="en-GB" sz="1000" dirty="0" smtClean="0">
@@ -3193,7 +3209,7 @@
                 <a:latin typeface="Courier New" panose="02070309020205020404" pitchFamily="49" charset="0"/>
                 <a:cs typeface="Courier New" panose="02070309020205020404" pitchFamily="49" charset="0"/>
               </a:rPr>
-              <a:t>getCV_cress</a:t>
+              <a:t>runsTest</a:t>
             </a:r>
             <a:r>
               <a:rPr lang="en-GB" sz="1000" dirty="0" smtClean="0">
@@ -3202,6 +3218,44 @@
               </a:rPr>
               <a:t>()</a:t>
             </a:r>
+          </a:p>
+          <a:p>
+            <a:pPr algn="ctr"/>
+            <a:r>
+              <a:rPr lang="en-GB" sz="1000" dirty="0" err="1" smtClean="0">
+                <a:latin typeface="Courier New" panose="02070309020205020404" pitchFamily="49" charset="0"/>
+                <a:cs typeface="Courier New" panose="02070309020205020404" pitchFamily="49" charset="0"/>
+              </a:rPr>
+              <a:t>summary.gamMRSea</a:t>
+            </a:r>
+            <a:r>
+              <a:rPr lang="en-GB" sz="1000" dirty="0" smtClean="0">
+                <a:latin typeface="Courier New" panose="02070309020205020404" pitchFamily="49" charset="0"/>
+                <a:cs typeface="Courier New" panose="02070309020205020404" pitchFamily="49" charset="0"/>
+              </a:rPr>
+              <a:t>()</a:t>
+            </a:r>
+          </a:p>
+          <a:p>
+            <a:pPr algn="ctr"/>
+            <a:r>
+              <a:rPr lang="en-GB" sz="1000" dirty="0" err="1">
+                <a:latin typeface="Courier New" panose="02070309020205020404" pitchFamily="49" charset="0"/>
+                <a:cs typeface="Courier New" panose="02070309020205020404" pitchFamily="49" charset="0"/>
+              </a:rPr>
+              <a:t>anova.gamMRSea</a:t>
+            </a:r>
+            <a:r>
+              <a:rPr lang="en-GB" sz="1000" dirty="0" smtClean="0">
+                <a:latin typeface="Courier New" panose="02070309020205020404" pitchFamily="49" charset="0"/>
+                <a:cs typeface="Courier New" panose="02070309020205020404" pitchFamily="49" charset="0"/>
+              </a:rPr>
+              <a:t>()</a:t>
+            </a:r>
+            <a:endParaRPr lang="en-GB" sz="1000" dirty="0" smtClean="0">
+              <a:latin typeface="Courier New" panose="02070309020205020404" pitchFamily="49" charset="0"/>
+              <a:cs typeface="Courier New" panose="02070309020205020404" pitchFamily="49" charset="0"/>
+            </a:endParaRPr>
           </a:p>
           <a:p>
             <a:pPr algn="ctr"/>
@@ -3927,73 +3981,6 @@
       </p:sp>
       <p:sp>
         <p:nvSpPr>
-          <p:cNvPr id="43" name="Oval 42"/>
-          <p:cNvSpPr/>
-          <p:nvPr/>
-        </p:nvSpPr>
-        <p:spPr>
-          <a:xfrm>
-            <a:off x="7320681" y="3685327"/>
-            <a:ext cx="1305213" cy="607769"/>
-          </a:xfrm>
-          <a:prstGeom prst="ellipse">
-            <a:avLst/>
-          </a:prstGeom>
-        </p:spPr>
-        <p:style>
-          <a:lnRef idx="1">
-            <a:schemeClr val="accent1"/>
-          </a:lnRef>
-          <a:fillRef idx="2">
-            <a:schemeClr val="accent1"/>
-          </a:fillRef>
-          <a:effectRef idx="1">
-            <a:schemeClr val="accent1"/>
-          </a:effectRef>
-          <a:fontRef idx="minor">
-            <a:schemeClr val="dk1"/>
-          </a:fontRef>
-        </p:style>
-        <p:txBody>
-          <a:bodyPr rtlCol="0" anchor="ctr"/>
-          <a:lstStyle/>
-          <a:p>
-            <a:pPr algn="ctr"/>
-            <a:r>
-              <a:rPr lang="en-GB" sz="1400" b="1" dirty="0" err="1"/>
-              <a:t>g</a:t>
-            </a:r>
-            <a:r>
-              <a:rPr lang="en-GB" sz="1400" b="1" dirty="0" err="1" smtClean="0"/>
-              <a:t>eepack</a:t>
-            </a:r>
-            <a:endParaRPr lang="en-GB" sz="1400" b="1" dirty="0" smtClean="0"/>
-          </a:p>
-          <a:p>
-            <a:pPr algn="ctr"/>
-            <a:r>
-              <a:rPr lang="en-GB" sz="1000" dirty="0">
-                <a:latin typeface="Courier New" panose="02070309020205020404" pitchFamily="49" charset="0"/>
-                <a:cs typeface="Courier New" panose="02070309020205020404" pitchFamily="49" charset="0"/>
-              </a:rPr>
-              <a:t>g</a:t>
-            </a:r>
-            <a:r>
-              <a:rPr lang="en-GB" sz="1000" dirty="0" smtClean="0">
-                <a:latin typeface="Courier New" panose="02070309020205020404" pitchFamily="49" charset="0"/>
-                <a:cs typeface="Courier New" panose="02070309020205020404" pitchFamily="49" charset="0"/>
-              </a:rPr>
-              <a:t>ee()</a:t>
-            </a:r>
-            <a:endParaRPr lang="en-GB" sz="900" dirty="0">
-              <a:latin typeface="Courier New" panose="02070309020205020404" pitchFamily="49" charset="0"/>
-              <a:cs typeface="Courier New" panose="02070309020205020404" pitchFamily="49" charset="0"/>
-            </a:endParaRPr>
-          </a:p>
-        </p:txBody>
-      </p:sp>
-      <p:sp>
-        <p:nvSpPr>
           <p:cNvPr id="44" name="Oval 43"/>
           <p:cNvSpPr/>
           <p:nvPr/>
@@ -4589,8 +4576,8 @@
         </p:nvSpPr>
         <p:spPr>
           <a:xfrm>
-            <a:off x="4198107" y="476672"/>
-            <a:ext cx="2103015" cy="756084"/>
+            <a:off x="4198107" y="66013"/>
+            <a:ext cx="2318109" cy="1166744"/>
           </a:xfrm>
           <a:prstGeom prst="ellipse">
             <a:avLst/>
@@ -4672,6 +4659,54 @@
               <a:t>()</a:t>
             </a:r>
           </a:p>
+          <a:p>
+            <a:pPr algn="ctr"/>
+            <a:r>
+              <a:rPr lang="en-GB" sz="1000" dirty="0" err="1">
+                <a:latin typeface="Courier New" panose="02070309020205020404" pitchFamily="49" charset="0"/>
+                <a:cs typeface="Courier New" panose="02070309020205020404" pitchFamily="49" charset="0"/>
+              </a:rPr>
+              <a:t>a</a:t>
+            </a:r>
+            <a:r>
+              <a:rPr lang="en-GB" sz="1000" dirty="0" err="1" smtClean="0">
+                <a:latin typeface="Courier New" panose="02070309020205020404" pitchFamily="49" charset="0"/>
+                <a:cs typeface="Courier New" panose="02070309020205020404" pitchFamily="49" charset="0"/>
+              </a:rPr>
+              <a:t>nova.gamMRSea</a:t>
+            </a:r>
+            <a:r>
+              <a:rPr lang="en-GB" sz="1000" dirty="0" smtClean="0">
+                <a:latin typeface="Courier New" panose="02070309020205020404" pitchFamily="49" charset="0"/>
+                <a:cs typeface="Courier New" panose="02070309020205020404" pitchFamily="49" charset="0"/>
+              </a:rPr>
+              <a:t>()</a:t>
+            </a:r>
+          </a:p>
+          <a:p>
+            <a:pPr algn="ctr"/>
+            <a:r>
+              <a:rPr lang="en-GB" sz="1000" dirty="0" err="1">
+                <a:latin typeface="Courier New" panose="02070309020205020404" pitchFamily="49" charset="0"/>
+                <a:cs typeface="Courier New" panose="02070309020205020404" pitchFamily="49" charset="0"/>
+              </a:rPr>
+              <a:t>summary.gamMRSea</a:t>
+            </a:r>
+            <a:r>
+              <a:rPr lang="en-GB" sz="1000" dirty="0">
+                <a:latin typeface="Courier New" panose="02070309020205020404" pitchFamily="49" charset="0"/>
+                <a:cs typeface="Courier New" panose="02070309020205020404" pitchFamily="49" charset="0"/>
+              </a:rPr>
+              <a:t>()</a:t>
+            </a:r>
+          </a:p>
+          <a:p>
+            <a:pPr algn="ctr"/>
+            <a:endParaRPr lang="en-GB" sz="1000" dirty="0" smtClean="0">
+              <a:latin typeface="Courier New" panose="02070309020205020404" pitchFamily="49" charset="0"/>
+              <a:cs typeface="Courier New" panose="02070309020205020404" pitchFamily="49" charset="0"/>
+            </a:endParaRPr>
+          </a:p>
         </p:txBody>
       </p:sp>
       <p:cxnSp>
@@ -4710,70 +4745,6 @@
           </a:fontRef>
         </p:style>
       </p:cxnSp>
-      <p:sp>
-        <p:nvSpPr>
-          <p:cNvPr id="133" name="Oval 132"/>
-          <p:cNvSpPr/>
-          <p:nvPr/>
-        </p:nvSpPr>
-        <p:spPr>
-          <a:xfrm>
-            <a:off x="5641467" y="285860"/>
-            <a:ext cx="1018765" cy="535761"/>
-          </a:xfrm>
-          <a:prstGeom prst="ellipse">
-            <a:avLst/>
-          </a:prstGeom>
-        </p:spPr>
-        <p:style>
-          <a:lnRef idx="1">
-            <a:schemeClr val="accent1"/>
-          </a:lnRef>
-          <a:fillRef idx="2">
-            <a:schemeClr val="accent1"/>
-          </a:fillRef>
-          <a:effectRef idx="1">
-            <a:schemeClr val="accent1"/>
-          </a:effectRef>
-          <a:fontRef idx="minor">
-            <a:schemeClr val="dk1"/>
-          </a:fontRef>
-        </p:style>
-        <p:txBody>
-          <a:bodyPr rtlCol="0" anchor="ctr"/>
-          <a:lstStyle/>
-          <a:p>
-            <a:pPr algn="ctr"/>
-            <a:r>
-              <a:rPr lang="en-GB" sz="1400" b="1" dirty="0" smtClean="0">
-                <a:cs typeface="Courier New" panose="02070309020205020404" pitchFamily="49" charset="0"/>
-              </a:rPr>
-              <a:t>car</a:t>
-            </a:r>
-          </a:p>
-          <a:p>
-            <a:pPr algn="ctr"/>
-            <a:r>
-              <a:rPr lang="en-GB" sz="1000" dirty="0" err="1" smtClean="0">
-                <a:latin typeface="Courier New" panose="02070309020205020404" pitchFamily="49" charset="0"/>
-                <a:cs typeface="Courier New" panose="02070309020205020404" pitchFamily="49" charset="0"/>
-              </a:rPr>
-              <a:t>Anova</a:t>
-            </a:r>
-            <a:r>
-              <a:rPr lang="en-GB" sz="1000" dirty="0" smtClean="0">
-                <a:latin typeface="Courier New" panose="02070309020205020404" pitchFamily="49" charset="0"/>
-                <a:cs typeface="Courier New" panose="02070309020205020404" pitchFamily="49" charset="0"/>
-              </a:rPr>
-              <a:t>()</a:t>
-            </a:r>
-            <a:endParaRPr lang="en-GB" sz="900" dirty="0">
-              <a:latin typeface="Courier New" panose="02070309020205020404" pitchFamily="49" charset="0"/>
-              <a:cs typeface="Courier New" panose="02070309020205020404" pitchFamily="49" charset="0"/>
-            </a:endParaRPr>
-          </a:p>
-        </p:txBody>
-      </p:sp>
       <p:cxnSp>
         <p:nvCxnSpPr>
           <p:cNvPr id="181" name="Straight Arrow Connector 180"/>
@@ -4890,6 +4861,136 @@
           </a:fontRef>
         </p:style>
       </p:cxnSp>
+      <p:sp>
+        <p:nvSpPr>
+          <p:cNvPr id="38" name="Oval 37"/>
+          <p:cNvSpPr/>
+          <p:nvPr/>
+        </p:nvSpPr>
+        <p:spPr>
+          <a:xfrm>
+            <a:off x="6791199" y="3657658"/>
+            <a:ext cx="1882871" cy="572501"/>
+          </a:xfrm>
+          <a:prstGeom prst="ellipse">
+            <a:avLst/>
+          </a:prstGeom>
+        </p:spPr>
+        <p:style>
+          <a:lnRef idx="1">
+            <a:schemeClr val="accent2"/>
+          </a:lnRef>
+          <a:fillRef idx="2">
+            <a:schemeClr val="accent2"/>
+          </a:fillRef>
+          <a:effectRef idx="1">
+            <a:schemeClr val="accent2"/>
+          </a:effectRef>
+          <a:fontRef idx="minor">
+            <a:schemeClr val="dk1"/>
+          </a:fontRef>
+        </p:style>
+        <p:txBody>
+          <a:bodyPr rtlCol="0" anchor="ctr"/>
+          <a:lstStyle/>
+          <a:p>
+            <a:pPr algn="ctr"/>
+            <a:r>
+              <a:rPr lang="en-GB" sz="1400" b="1" dirty="0" err="1" smtClean="0"/>
+              <a:t>MRSea</a:t>
+            </a:r>
+            <a:endParaRPr lang="en-GB" sz="1400" b="1" dirty="0" smtClean="0"/>
+          </a:p>
+          <a:p>
+            <a:pPr algn="ctr"/>
+            <a:r>
+              <a:rPr lang="en-GB" sz="1000" dirty="0" err="1" smtClean="0">
+                <a:latin typeface="Courier New" panose="02070309020205020404" pitchFamily="49" charset="0"/>
+                <a:cs typeface="Courier New" panose="02070309020205020404" pitchFamily="49" charset="0"/>
+              </a:rPr>
+              <a:t>make.gamMRSea</a:t>
+            </a:r>
+            <a:r>
+              <a:rPr lang="en-GB" sz="1000" dirty="0" smtClean="0">
+                <a:latin typeface="Courier New" panose="02070309020205020404" pitchFamily="49" charset="0"/>
+                <a:cs typeface="Courier New" panose="02070309020205020404" pitchFamily="49" charset="0"/>
+              </a:rPr>
+              <a:t>()</a:t>
+            </a:r>
+            <a:endParaRPr lang="en-GB" sz="1000" dirty="0">
+              <a:latin typeface="Courier New" panose="02070309020205020404" pitchFamily="49" charset="0"/>
+              <a:cs typeface="Courier New" panose="02070309020205020404" pitchFamily="49" charset="0"/>
+            </a:endParaRPr>
+          </a:p>
+        </p:txBody>
+      </p:sp>
+      <p:sp>
+        <p:nvSpPr>
+          <p:cNvPr id="43" name="Oval 42"/>
+          <p:cNvSpPr/>
+          <p:nvPr/>
+        </p:nvSpPr>
+        <p:spPr>
+          <a:xfrm>
+            <a:off x="7305501" y="4151079"/>
+            <a:ext cx="1305213" cy="607769"/>
+          </a:xfrm>
+          <a:prstGeom prst="ellipse">
+            <a:avLst/>
+          </a:prstGeom>
+        </p:spPr>
+        <p:style>
+          <a:lnRef idx="1">
+            <a:schemeClr val="accent1"/>
+          </a:lnRef>
+          <a:fillRef idx="2">
+            <a:schemeClr val="accent1"/>
+          </a:fillRef>
+          <a:effectRef idx="1">
+            <a:schemeClr val="accent1"/>
+          </a:effectRef>
+          <a:fontRef idx="minor">
+            <a:schemeClr val="dk1"/>
+          </a:fontRef>
+        </p:style>
+        <p:txBody>
+          <a:bodyPr rtlCol="0" anchor="ctr"/>
+          <a:lstStyle/>
+          <a:p>
+            <a:pPr algn="ctr"/>
+            <a:r>
+              <a:rPr lang="en-GB" sz="1400" b="1" dirty="0" err="1"/>
+              <a:t>g</a:t>
+            </a:r>
+            <a:r>
+              <a:rPr lang="en-GB" sz="1400" b="1" dirty="0" err="1" smtClean="0"/>
+              <a:t>eepack</a:t>
+            </a:r>
+            <a:endParaRPr lang="en-GB" sz="1400" b="1" dirty="0" smtClean="0"/>
+          </a:p>
+          <a:p>
+            <a:pPr algn="ctr"/>
+            <a:r>
+              <a:rPr lang="en-GB" sz="1000" dirty="0">
+                <a:latin typeface="Courier New" panose="02070309020205020404" pitchFamily="49" charset="0"/>
+                <a:cs typeface="Courier New" panose="02070309020205020404" pitchFamily="49" charset="0"/>
+              </a:rPr>
+              <a:t>g</a:t>
+            </a:r>
+            <a:r>
+              <a:rPr lang="en-GB" sz="1000" dirty="0" smtClean="0">
+                <a:latin typeface="Courier New" panose="02070309020205020404" pitchFamily="49" charset="0"/>
+                <a:cs typeface="Courier New" panose="02070309020205020404" pitchFamily="49" charset="0"/>
+              </a:rPr>
+              <a:t>ee()</a:t>
+            </a:r>
+            <a:endParaRPr lang="en-GB" sz="900" dirty="0">
+              <a:latin typeface="Courier New" panose="02070309020205020404" pitchFamily="49" charset="0"/>
+              <a:cs typeface="Courier New" panose="02070309020205020404" pitchFamily="49" charset="0"/>
+            </a:endParaRPr>
+          </a:p>
+        </p:txBody>
+      </p:sp>
     </p:spTree>
     <p:extLst>
       <p:ext uri="{BB962C8B-B14F-4D97-AF65-F5344CB8AC3E}">

</xml_diff>